<commit_message>
added inhertiance example, and exercise 9
</commit_message>
<xml_diff>
--- a/Tut_Files/Tut_5.12.pptx
+++ b/Tut_Files/Tut_5.12.pptx
@@ -13,7 +13,8 @@
     <p:sldId id="262" r:id="rId7"/>
     <p:sldId id="263" r:id="rId8"/>
     <p:sldId id="264" r:id="rId9"/>
-    <p:sldId id="265" r:id="rId10"/>
+    <p:sldId id="266" r:id="rId10"/>
+    <p:sldId id="265" r:id="rId11"/>
   </p:sldIdLst>
   <p:sldSz cx="12192000" cy="6858000"/>
   <p:notesSz cx="6858000" cy="9144000"/>
@@ -112,6 +113,11 @@
       </a:defRPr>
     </a:lvl9pPr>
   </p:defaultTextStyle>
+  <p:extLst>
+    <p:ext uri="{EFAFB233-063F-42B5-8137-9DF3F51BA10A}">
+      <p15:sldGuideLst xmlns:p15="http://schemas.microsoft.com/office/powerpoint/2012/main"/>
+    </p:ext>
+  </p:extLst>
 </p:presentation>
 </file>
 
@@ -246,7 +252,7 @@
           <a:p>
             <a:fld id="{A33CD73A-80A9-4140-8142-C68866F2599D}" type="datetimeFigureOut">
               <a:rPr lang="de-DE" smtClean="0"/>
-              <a:t>03.12.2016</a:t>
+              <a:t>04.12.2016</a:t>
             </a:fld>
             <a:endParaRPr lang="de-DE"/>
           </a:p>
@@ -416,7 +422,7 @@
           <a:p>
             <a:fld id="{A33CD73A-80A9-4140-8142-C68866F2599D}" type="datetimeFigureOut">
               <a:rPr lang="de-DE" smtClean="0"/>
-              <a:t>03.12.2016</a:t>
+              <a:t>04.12.2016</a:t>
             </a:fld>
             <a:endParaRPr lang="de-DE"/>
           </a:p>
@@ -596,7 +602,7 @@
           <a:p>
             <a:fld id="{A33CD73A-80A9-4140-8142-C68866F2599D}" type="datetimeFigureOut">
               <a:rPr lang="de-DE" smtClean="0"/>
-              <a:t>03.12.2016</a:t>
+              <a:t>04.12.2016</a:t>
             </a:fld>
             <a:endParaRPr lang="de-DE"/>
           </a:p>
@@ -766,7 +772,7 @@
           <a:p>
             <a:fld id="{A33CD73A-80A9-4140-8142-C68866F2599D}" type="datetimeFigureOut">
               <a:rPr lang="de-DE" smtClean="0"/>
-              <a:t>03.12.2016</a:t>
+              <a:t>04.12.2016</a:t>
             </a:fld>
             <a:endParaRPr lang="de-DE"/>
           </a:p>
@@ -1012,7 +1018,7 @@
           <a:p>
             <a:fld id="{A33CD73A-80A9-4140-8142-C68866F2599D}" type="datetimeFigureOut">
               <a:rPr lang="de-DE" smtClean="0"/>
-              <a:t>03.12.2016</a:t>
+              <a:t>04.12.2016</a:t>
             </a:fld>
             <a:endParaRPr lang="de-DE"/>
           </a:p>
@@ -1244,7 +1250,7 @@
           <a:p>
             <a:fld id="{A33CD73A-80A9-4140-8142-C68866F2599D}" type="datetimeFigureOut">
               <a:rPr lang="de-DE" smtClean="0"/>
-              <a:t>03.12.2016</a:t>
+              <a:t>04.12.2016</a:t>
             </a:fld>
             <a:endParaRPr lang="de-DE"/>
           </a:p>
@@ -1611,7 +1617,7 @@
           <a:p>
             <a:fld id="{A33CD73A-80A9-4140-8142-C68866F2599D}" type="datetimeFigureOut">
               <a:rPr lang="de-DE" smtClean="0"/>
-              <a:t>03.12.2016</a:t>
+              <a:t>04.12.2016</a:t>
             </a:fld>
             <a:endParaRPr lang="de-DE"/>
           </a:p>
@@ -1729,7 +1735,7 @@
           <a:p>
             <a:fld id="{A33CD73A-80A9-4140-8142-C68866F2599D}" type="datetimeFigureOut">
               <a:rPr lang="de-DE" smtClean="0"/>
-              <a:t>03.12.2016</a:t>
+              <a:t>04.12.2016</a:t>
             </a:fld>
             <a:endParaRPr lang="de-DE"/>
           </a:p>
@@ -1824,7 +1830,7 @@
           <a:p>
             <a:fld id="{A33CD73A-80A9-4140-8142-C68866F2599D}" type="datetimeFigureOut">
               <a:rPr lang="de-DE" smtClean="0"/>
-              <a:t>03.12.2016</a:t>
+              <a:t>04.12.2016</a:t>
             </a:fld>
             <a:endParaRPr lang="de-DE"/>
           </a:p>
@@ -2101,7 +2107,7 @@
           <a:p>
             <a:fld id="{A33CD73A-80A9-4140-8142-C68866F2599D}" type="datetimeFigureOut">
               <a:rPr lang="de-DE" smtClean="0"/>
-              <a:t>03.12.2016</a:t>
+              <a:t>04.12.2016</a:t>
             </a:fld>
             <a:endParaRPr lang="de-DE"/>
           </a:p>
@@ -2354,7 +2360,7 @@
           <a:p>
             <a:fld id="{A33CD73A-80A9-4140-8142-C68866F2599D}" type="datetimeFigureOut">
               <a:rPr lang="de-DE" smtClean="0"/>
-              <a:t>03.12.2016</a:t>
+              <a:t>04.12.2016</a:t>
             </a:fld>
             <a:endParaRPr lang="de-DE"/>
           </a:p>
@@ -2567,7 +2573,7 @@
           <a:p>
             <a:fld id="{A33CD73A-80A9-4140-8142-C68866F2599D}" type="datetimeFigureOut">
               <a:rPr lang="de-DE" smtClean="0"/>
-              <a:t>03.12.2016</a:t>
+              <a:t>04.12.2016</a:t>
             </a:fld>
             <a:endParaRPr lang="de-DE"/>
           </a:p>
@@ -3127,6 +3133,87 @@
 </p:sld>
 </file>
 
+<file path=ppt/slides/slide10.xml><?xml version="1.0" encoding="utf-8"?>
+<p:sld xmlns:a="http://schemas.openxmlformats.org/drawingml/2006/main" xmlns:r="http://schemas.openxmlformats.org/officeDocument/2006/relationships" xmlns:p="http://schemas.openxmlformats.org/presentationml/2006/main">
+  <p:cSld>
+    <p:spTree>
+      <p:nvGrpSpPr>
+        <p:cNvPr id="1" name=""/>
+        <p:cNvGrpSpPr/>
+        <p:nvPr/>
+      </p:nvGrpSpPr>
+      <p:grpSpPr>
+        <a:xfrm>
+          <a:off x="0" y="0"/>
+          <a:ext cx="0" cy="0"/>
+          <a:chOff x="0" y="0"/>
+          <a:chExt cx="0" cy="0"/>
+        </a:xfrm>
+      </p:grpSpPr>
+      <p:sp>
+        <p:nvSpPr>
+          <p:cNvPr id="2" name="Title 1"/>
+          <p:cNvSpPr>
+            <a:spLocks noGrp="1"/>
+          </p:cNvSpPr>
+          <p:nvPr>
+            <p:ph type="title"/>
+          </p:nvPr>
+        </p:nvSpPr>
+        <p:spPr/>
+        <p:txBody>
+          <a:bodyPr/>
+          <a:lstStyle/>
+          <a:p>
+            <a:r>
+              <a:rPr lang="de-DE" dirty="0"/>
+              <a:t>Vererbung</a:t>
+            </a:r>
+          </a:p>
+        </p:txBody>
+      </p:sp>
+      <p:sp>
+        <p:nvSpPr>
+          <p:cNvPr id="3" name="Content Placeholder 2"/>
+          <p:cNvSpPr>
+            <a:spLocks noGrp="1"/>
+          </p:cNvSpPr>
+          <p:nvPr>
+            <p:ph idx="1"/>
+          </p:nvPr>
+        </p:nvSpPr>
+        <p:spPr/>
+        <p:txBody>
+          <a:bodyPr/>
+          <a:lstStyle/>
+          <a:p>
+            <a:r>
+              <a:rPr lang="de-DE" dirty="0"/>
+              <a:t>Beispiel Spieleprogrammierung Enemy and Follower</a:t>
+            </a:r>
+            <a:endParaRPr lang="de-DE" dirty="0"/>
+          </a:p>
+          <a:p>
+            <a:r>
+              <a:rPr lang="de-DE" dirty="0"/>
+              <a:t>Beispiel Code + Konzept für Aufgabe 9</a:t>
+            </a:r>
+          </a:p>
+        </p:txBody>
+      </p:sp>
+    </p:spTree>
+    <p:extLst>
+      <p:ext uri="{BB962C8B-B14F-4D97-AF65-F5344CB8AC3E}">
+        <p14:creationId xmlns:p14="http://schemas.microsoft.com/office/powerpoint/2010/main" val="2580896225"/>
+      </p:ext>
+    </p:extLst>
+  </p:cSld>
+  <p:clrMapOvr>
+    <a:masterClrMapping/>
+  </p:clrMapOvr>
+</p:sld>
+</file>
+
 <file path=ppt/slides/slide2.xml><?xml version="1.0" encoding="utf-8"?>
 <p:sld xmlns:a="http://schemas.openxmlformats.org/drawingml/2006/main" xmlns:r="http://schemas.openxmlformats.org/officeDocument/2006/relationships" xmlns:p="http://schemas.openxmlformats.org/presentationml/2006/main">
   <p:cSld>
@@ -3893,6 +3980,7 @@
               <a:rPr lang="de-DE" dirty="0"/>
               <a:t>Vererbung</a:t>
             </a:r>
+            <a:endParaRPr lang="de-DE" dirty="0"/>
           </a:p>
         </p:txBody>
       </p:sp>
@@ -3908,12 +3996,52 @@
         </p:nvSpPr>
         <p:spPr/>
         <p:txBody>
-          <a:bodyPr/>
+          <a:bodyPr>
+            <a:normAutofit lnSpcReduction="10000"/>
+          </a:bodyPr>
           <a:lstStyle/>
           <a:p>
             <a:r>
               <a:rPr lang="de-DE" dirty="0"/>
-              <a:t>Konzept für Aufgabe 9</a:t>
+              <a:t>Nur in Objektorientierung möglich</a:t>
+            </a:r>
+          </a:p>
+          <a:p>
+            <a:r>
+              <a:rPr lang="de-DE" dirty="0"/>
+              <a:t>Die Idee dahinter:</a:t>
+            </a:r>
+          </a:p>
+          <a:p>
+            <a:pPr lvl="1"/>
+            <a:r>
+              <a:rPr lang="de-DE" dirty="0"/>
+              <a:t> Wenn man eine Klasse deklarieren will und es bereits eine Klasse gibt, die Code beinhaltet, den man in der neuen Klasse haben will.</a:t>
+            </a:r>
+          </a:p>
+          <a:p>
+            <a:r>
+              <a:rPr lang="de-DE" dirty="0"/>
+              <a:t>Man kann Felder und Methoden erneut verwenden, ohne sie erneut zu schreiben</a:t>
+            </a:r>
+          </a:p>
+          <a:p>
+            <a:r>
+              <a:rPr lang="de-DE" dirty="0"/>
+              <a:t>Eine Subklasse (Sohn) beinhaltet alle Felder, Methoden und verschachtelte Klassen von iherer Superklasse(Vater)</a:t>
+            </a:r>
+          </a:p>
+          <a:p>
+            <a:r>
+              <a:rPr lang="de-DE" dirty="0"/>
+              <a:t>Nur Instanz Variable und Methoden können vererbt werden (kein static)</a:t>
+            </a:r>
+          </a:p>
+          <a:p>
+            <a:pPr lvl="1"/>
+            <a:r>
+              <a:rPr lang="de-DE" dirty="0"/>
+              <a:t>Static in der definition: Klasseneigene Variable/Methode</a:t>
             </a:r>
           </a:p>
         </p:txBody>
@@ -3921,7 +4049,7 @@
     </p:spTree>
     <p:extLst>
       <p:ext uri="{BB962C8B-B14F-4D97-AF65-F5344CB8AC3E}">
-        <p14:creationId xmlns:p14="http://schemas.microsoft.com/office/powerpoint/2010/main" val="2580896225"/>
+        <p14:creationId xmlns:p14="http://schemas.microsoft.com/office/powerpoint/2010/main" val="1369498112"/>
       </p:ext>
     </p:extLst>
   </p:cSld>

</xml_diff>

<commit_message>
Last changes for Tut added notes for life coding
</commit_message>
<xml_diff>
--- a/Tut_Files/Tut_5.12.pptx
+++ b/Tut_Files/Tut_5.12.pptx
@@ -4,6 +4,9 @@
   <p:sldMasterIdLst>
     <p:sldMasterId id="2147483648" r:id="rId1"/>
   </p:sldMasterIdLst>
+  <p:notesMasterIdLst>
+    <p:notesMasterId r:id="rId12"/>
+  </p:notesMasterIdLst>
   <p:sldIdLst>
     <p:sldId id="258" r:id="rId2"/>
     <p:sldId id="257" r:id="rId3"/>
@@ -121,6 +124,554 @@
 </p:presentation>
 </file>
 
+<file path=ppt/notesMasters/notesMaster1.xml><?xml version="1.0" encoding="utf-8"?>
+<p:notesMaster xmlns:a="http://schemas.openxmlformats.org/drawingml/2006/main" xmlns:r="http://schemas.openxmlformats.org/officeDocument/2006/relationships" xmlns:p="http://schemas.openxmlformats.org/presentationml/2006/main">
+  <p:cSld>
+    <p:bg>
+      <p:bgRef idx="1001">
+        <a:schemeClr val="bg1"/>
+      </p:bgRef>
+    </p:bg>
+    <p:spTree>
+      <p:nvGrpSpPr>
+        <p:cNvPr id="1" name=""/>
+        <p:cNvGrpSpPr/>
+        <p:nvPr/>
+      </p:nvGrpSpPr>
+      <p:grpSpPr>
+        <a:xfrm>
+          <a:off x="0" y="0"/>
+          <a:ext cx="0" cy="0"/>
+          <a:chOff x="0" y="0"/>
+          <a:chExt cx="0" cy="0"/>
+        </a:xfrm>
+      </p:grpSpPr>
+      <p:sp>
+        <p:nvSpPr>
+          <p:cNvPr id="2" name="Header Placeholder 1"/>
+          <p:cNvSpPr>
+            <a:spLocks noGrp="1"/>
+          </p:cNvSpPr>
+          <p:nvPr>
+            <p:ph type="hdr" sz="quarter"/>
+          </p:nvPr>
+        </p:nvSpPr>
+        <p:spPr>
+          <a:xfrm>
+            <a:off x="0" y="0"/>
+            <a:ext cx="2971800" cy="458788"/>
+          </a:xfrm>
+          <a:prstGeom prst="rect">
+            <a:avLst/>
+          </a:prstGeom>
+        </p:spPr>
+        <p:txBody>
+          <a:bodyPr vert="horz" lIns="91440" tIns="45720" rIns="91440" bIns="45720" rtlCol="0"/>
+          <a:lstStyle>
+            <a:lvl1pPr algn="l">
+              <a:defRPr sz="1200"/>
+            </a:lvl1pPr>
+          </a:lstStyle>
+          <a:p>
+            <a:endParaRPr lang="de-DE"/>
+          </a:p>
+        </p:txBody>
+      </p:sp>
+      <p:sp>
+        <p:nvSpPr>
+          <p:cNvPr id="3" name="Date Placeholder 2"/>
+          <p:cNvSpPr>
+            <a:spLocks noGrp="1"/>
+          </p:cNvSpPr>
+          <p:nvPr>
+            <p:ph type="dt" idx="1"/>
+          </p:nvPr>
+        </p:nvSpPr>
+        <p:spPr>
+          <a:xfrm>
+            <a:off x="3884613" y="0"/>
+            <a:ext cx="2971800" cy="458788"/>
+          </a:xfrm>
+          <a:prstGeom prst="rect">
+            <a:avLst/>
+          </a:prstGeom>
+        </p:spPr>
+        <p:txBody>
+          <a:bodyPr vert="horz" lIns="91440" tIns="45720" rIns="91440" bIns="45720" rtlCol="0"/>
+          <a:lstStyle>
+            <a:lvl1pPr algn="r">
+              <a:defRPr sz="1200"/>
+            </a:lvl1pPr>
+          </a:lstStyle>
+          <a:p>
+            <a:fld id="{5D8924E5-2969-4828-BD77-3FF252179808}" type="datetimeFigureOut">
+              <a:rPr lang="de-DE" smtClean="0"/>
+              <a:t>05.12.2016</a:t>
+            </a:fld>
+            <a:endParaRPr lang="de-DE"/>
+          </a:p>
+        </p:txBody>
+      </p:sp>
+      <p:sp>
+        <p:nvSpPr>
+          <p:cNvPr id="4" name="Slide Image Placeholder 3"/>
+          <p:cNvSpPr>
+            <a:spLocks noGrp="1" noRot="1" noChangeAspect="1"/>
+          </p:cNvSpPr>
+          <p:nvPr>
+            <p:ph type="sldImg" idx="2"/>
+          </p:nvPr>
+        </p:nvSpPr>
+        <p:spPr>
+          <a:xfrm>
+            <a:off x="685800" y="1143000"/>
+            <a:ext cx="5486400" cy="3086100"/>
+          </a:xfrm>
+          <a:prstGeom prst="rect">
+            <a:avLst/>
+          </a:prstGeom>
+          <a:noFill/>
+          <a:ln w="12700">
+            <a:solidFill>
+              <a:prstClr val="black"/>
+            </a:solidFill>
+          </a:ln>
+        </p:spPr>
+        <p:txBody>
+          <a:bodyPr vert="horz" lIns="91440" tIns="45720" rIns="91440" bIns="45720" rtlCol="0" anchor="ctr"/>
+          <a:lstStyle/>
+          <a:p>
+            <a:endParaRPr lang="de-DE"/>
+          </a:p>
+        </p:txBody>
+      </p:sp>
+      <p:sp>
+        <p:nvSpPr>
+          <p:cNvPr id="5" name="Notes Placeholder 4"/>
+          <p:cNvSpPr>
+            <a:spLocks noGrp="1"/>
+          </p:cNvSpPr>
+          <p:nvPr>
+            <p:ph type="body" sz="quarter" idx="3"/>
+          </p:nvPr>
+        </p:nvSpPr>
+        <p:spPr>
+          <a:xfrm>
+            <a:off x="685800" y="4400550"/>
+            <a:ext cx="5486400" cy="3600450"/>
+          </a:xfrm>
+          <a:prstGeom prst="rect">
+            <a:avLst/>
+          </a:prstGeom>
+        </p:spPr>
+        <p:txBody>
+          <a:bodyPr vert="horz" lIns="91440" tIns="45720" rIns="91440" bIns="45720" rtlCol="0"/>
+          <a:lstStyle/>
+          <a:p>
+            <a:pPr lvl="0"/>
+            <a:r>
+              <a:rPr lang="en-US"/>
+              <a:t>Edit Master text styles</a:t>
+            </a:r>
+          </a:p>
+          <a:p>
+            <a:pPr lvl="1"/>
+            <a:r>
+              <a:rPr lang="en-US"/>
+              <a:t>Second level</a:t>
+            </a:r>
+          </a:p>
+          <a:p>
+            <a:pPr lvl="2"/>
+            <a:r>
+              <a:rPr lang="en-US"/>
+              <a:t>Third level</a:t>
+            </a:r>
+          </a:p>
+          <a:p>
+            <a:pPr lvl="3"/>
+            <a:r>
+              <a:rPr lang="en-US"/>
+              <a:t>Fourth level</a:t>
+            </a:r>
+          </a:p>
+          <a:p>
+            <a:pPr lvl="4"/>
+            <a:r>
+              <a:rPr lang="en-US"/>
+              <a:t>Fifth level</a:t>
+            </a:r>
+            <a:endParaRPr lang="de-DE"/>
+          </a:p>
+        </p:txBody>
+      </p:sp>
+      <p:sp>
+        <p:nvSpPr>
+          <p:cNvPr id="6" name="Footer Placeholder 5"/>
+          <p:cNvSpPr>
+            <a:spLocks noGrp="1"/>
+          </p:cNvSpPr>
+          <p:nvPr>
+            <p:ph type="ftr" sz="quarter" idx="4"/>
+          </p:nvPr>
+        </p:nvSpPr>
+        <p:spPr>
+          <a:xfrm>
+            <a:off x="0" y="8685213"/>
+            <a:ext cx="2971800" cy="458787"/>
+          </a:xfrm>
+          <a:prstGeom prst="rect">
+            <a:avLst/>
+          </a:prstGeom>
+        </p:spPr>
+        <p:txBody>
+          <a:bodyPr vert="horz" lIns="91440" tIns="45720" rIns="91440" bIns="45720" rtlCol="0" anchor="b"/>
+          <a:lstStyle>
+            <a:lvl1pPr algn="l">
+              <a:defRPr sz="1200"/>
+            </a:lvl1pPr>
+          </a:lstStyle>
+          <a:p>
+            <a:endParaRPr lang="de-DE"/>
+          </a:p>
+        </p:txBody>
+      </p:sp>
+      <p:sp>
+        <p:nvSpPr>
+          <p:cNvPr id="7" name="Slide Number Placeholder 6"/>
+          <p:cNvSpPr>
+            <a:spLocks noGrp="1"/>
+          </p:cNvSpPr>
+          <p:nvPr>
+            <p:ph type="sldNum" sz="quarter" idx="5"/>
+          </p:nvPr>
+        </p:nvSpPr>
+        <p:spPr>
+          <a:xfrm>
+            <a:off x="3884613" y="8685213"/>
+            <a:ext cx="2971800" cy="458787"/>
+          </a:xfrm>
+          <a:prstGeom prst="rect">
+            <a:avLst/>
+          </a:prstGeom>
+        </p:spPr>
+        <p:txBody>
+          <a:bodyPr vert="horz" lIns="91440" tIns="45720" rIns="91440" bIns="45720" rtlCol="0" anchor="b"/>
+          <a:lstStyle>
+            <a:lvl1pPr algn="r">
+              <a:defRPr sz="1200"/>
+            </a:lvl1pPr>
+          </a:lstStyle>
+          <a:p>
+            <a:fld id="{7CB34A70-C7AB-4AAE-AF88-0E84F95289E5}" type="slidenum">
+              <a:rPr lang="de-DE" smtClean="0"/>
+              <a:t>‹#›</a:t>
+            </a:fld>
+            <a:endParaRPr lang="de-DE"/>
+          </a:p>
+        </p:txBody>
+      </p:sp>
+    </p:spTree>
+    <p:extLst>
+      <p:ext uri="{BB962C8B-B14F-4D97-AF65-F5344CB8AC3E}">
+        <p14:creationId xmlns:p14="http://schemas.microsoft.com/office/powerpoint/2010/main" val="1228154587"/>
+      </p:ext>
+    </p:extLst>
+  </p:cSld>
+  <p:clrMap bg1="lt1" tx1="dk1" bg2="lt2" tx2="dk2" accent1="accent1" accent2="accent2" accent3="accent3" accent4="accent4" accent5="accent5" accent6="accent6" hlink="hlink" folHlink="folHlink"/>
+  <p:notesStyle>
+    <a:lvl1pPr marL="0" algn="l" defTabSz="914400" rtl="0" eaLnBrk="1" latinLnBrk="0" hangingPunct="1">
+      <a:defRPr sz="1200" kern="1200">
+        <a:solidFill>
+          <a:schemeClr val="tx1"/>
+        </a:solidFill>
+        <a:latin typeface="+mn-lt"/>
+        <a:ea typeface="+mn-ea"/>
+        <a:cs typeface="+mn-cs"/>
+      </a:defRPr>
+    </a:lvl1pPr>
+    <a:lvl2pPr marL="457200" algn="l" defTabSz="914400" rtl="0" eaLnBrk="1" latinLnBrk="0" hangingPunct="1">
+      <a:defRPr sz="1200" kern="1200">
+        <a:solidFill>
+          <a:schemeClr val="tx1"/>
+        </a:solidFill>
+        <a:latin typeface="+mn-lt"/>
+        <a:ea typeface="+mn-ea"/>
+        <a:cs typeface="+mn-cs"/>
+      </a:defRPr>
+    </a:lvl2pPr>
+    <a:lvl3pPr marL="914400" algn="l" defTabSz="914400" rtl="0" eaLnBrk="1" latinLnBrk="0" hangingPunct="1">
+      <a:defRPr sz="1200" kern="1200">
+        <a:solidFill>
+          <a:schemeClr val="tx1"/>
+        </a:solidFill>
+        <a:latin typeface="+mn-lt"/>
+        <a:ea typeface="+mn-ea"/>
+        <a:cs typeface="+mn-cs"/>
+      </a:defRPr>
+    </a:lvl3pPr>
+    <a:lvl4pPr marL="1371600" algn="l" defTabSz="914400" rtl="0" eaLnBrk="1" latinLnBrk="0" hangingPunct="1">
+      <a:defRPr sz="1200" kern="1200">
+        <a:solidFill>
+          <a:schemeClr val="tx1"/>
+        </a:solidFill>
+        <a:latin typeface="+mn-lt"/>
+        <a:ea typeface="+mn-ea"/>
+        <a:cs typeface="+mn-cs"/>
+      </a:defRPr>
+    </a:lvl4pPr>
+    <a:lvl5pPr marL="1828800" algn="l" defTabSz="914400" rtl="0" eaLnBrk="1" latinLnBrk="0" hangingPunct="1">
+      <a:defRPr sz="1200" kern="1200">
+        <a:solidFill>
+          <a:schemeClr val="tx1"/>
+        </a:solidFill>
+        <a:latin typeface="+mn-lt"/>
+        <a:ea typeface="+mn-ea"/>
+        <a:cs typeface="+mn-cs"/>
+      </a:defRPr>
+    </a:lvl5pPr>
+    <a:lvl6pPr marL="2286000" algn="l" defTabSz="914400" rtl="0" eaLnBrk="1" latinLnBrk="0" hangingPunct="1">
+      <a:defRPr sz="1200" kern="1200">
+        <a:solidFill>
+          <a:schemeClr val="tx1"/>
+        </a:solidFill>
+        <a:latin typeface="+mn-lt"/>
+        <a:ea typeface="+mn-ea"/>
+        <a:cs typeface="+mn-cs"/>
+      </a:defRPr>
+    </a:lvl6pPr>
+    <a:lvl7pPr marL="2743200" algn="l" defTabSz="914400" rtl="0" eaLnBrk="1" latinLnBrk="0" hangingPunct="1">
+      <a:defRPr sz="1200" kern="1200">
+        <a:solidFill>
+          <a:schemeClr val="tx1"/>
+        </a:solidFill>
+        <a:latin typeface="+mn-lt"/>
+        <a:ea typeface="+mn-ea"/>
+        <a:cs typeface="+mn-cs"/>
+      </a:defRPr>
+    </a:lvl7pPr>
+    <a:lvl8pPr marL="3200400" algn="l" defTabSz="914400" rtl="0" eaLnBrk="1" latinLnBrk="0" hangingPunct="1">
+      <a:defRPr sz="1200" kern="1200">
+        <a:solidFill>
+          <a:schemeClr val="tx1"/>
+        </a:solidFill>
+        <a:latin typeface="+mn-lt"/>
+        <a:ea typeface="+mn-ea"/>
+        <a:cs typeface="+mn-cs"/>
+      </a:defRPr>
+    </a:lvl8pPr>
+    <a:lvl9pPr marL="3657600" algn="l" defTabSz="914400" rtl="0" eaLnBrk="1" latinLnBrk="0" hangingPunct="1">
+      <a:defRPr sz="1200" kern="1200">
+        <a:solidFill>
+          <a:schemeClr val="tx1"/>
+        </a:solidFill>
+        <a:latin typeface="+mn-lt"/>
+        <a:ea typeface="+mn-ea"/>
+        <a:cs typeface="+mn-cs"/>
+      </a:defRPr>
+    </a:lvl9pPr>
+  </p:notesStyle>
+</p:notesMaster>
+</file>
+
+<file path=ppt/notesSlides/notesSlide1.xml><?xml version="1.0" encoding="utf-8"?>
+<p:notes xmlns:a="http://schemas.openxmlformats.org/drawingml/2006/main" xmlns:r="http://schemas.openxmlformats.org/officeDocument/2006/relationships" xmlns:p="http://schemas.openxmlformats.org/presentationml/2006/main">
+  <p:cSld>
+    <p:spTree>
+      <p:nvGrpSpPr>
+        <p:cNvPr id="1" name=""/>
+        <p:cNvGrpSpPr/>
+        <p:nvPr/>
+      </p:nvGrpSpPr>
+      <p:grpSpPr>
+        <a:xfrm>
+          <a:off x="0" y="0"/>
+          <a:ext cx="0" cy="0"/>
+          <a:chOff x="0" y="0"/>
+          <a:chExt cx="0" cy="0"/>
+        </a:xfrm>
+      </p:grpSpPr>
+      <p:sp>
+        <p:nvSpPr>
+          <p:cNvPr id="2" name="Slide Image Placeholder 1"/>
+          <p:cNvSpPr>
+            <a:spLocks noGrp="1" noRot="1" noChangeAspect="1"/>
+          </p:cNvSpPr>
+          <p:nvPr>
+            <p:ph type="sldImg"/>
+          </p:nvPr>
+        </p:nvSpPr>
+        <p:spPr/>
+      </p:sp>
+      <p:sp>
+        <p:nvSpPr>
+          <p:cNvPr id="3" name="Notes Placeholder 2"/>
+          <p:cNvSpPr>
+            <a:spLocks noGrp="1"/>
+          </p:cNvSpPr>
+          <p:nvPr>
+            <p:ph type="body" idx="1"/>
+          </p:nvPr>
+        </p:nvSpPr>
+        <p:spPr/>
+        <p:txBody>
+          <a:bodyPr/>
+          <a:lstStyle/>
+          <a:p>
+            <a:r>
+              <a:rPr lang="de-DE" dirty="0"/>
+              <a:t>Rekursionen für Bäume</a:t>
+            </a:r>
+            <a:r>
+              <a:rPr lang="de-DE" baseline="0" dirty="0"/>
+              <a:t> </a:t>
+            </a:r>
+            <a:r>
+              <a:rPr lang="de-DE" baseline="0" dirty="0">
+                <a:sym typeface="Wingdings" panose="05000000000000000000" pitchFamily="2" charset="2"/>
+              </a:rPr>
+              <a:t> übersichtlicher, kleiner</a:t>
+            </a:r>
+          </a:p>
+          <a:p>
+            <a:r>
+              <a:rPr lang="de-DE" baseline="0" dirty="0">
+                <a:sym typeface="Wingdings" panose="05000000000000000000" pitchFamily="2" charset="2"/>
+              </a:rPr>
+              <a:t>Iterativ  belegen keinen eigenen Platz im Stack</a:t>
+            </a:r>
+          </a:p>
+          <a:p>
+            <a:endParaRPr lang="de-DE" dirty="0"/>
+          </a:p>
+        </p:txBody>
+      </p:sp>
+      <p:sp>
+        <p:nvSpPr>
+          <p:cNvPr id="4" name="Slide Number Placeholder 3"/>
+          <p:cNvSpPr>
+            <a:spLocks noGrp="1"/>
+          </p:cNvSpPr>
+          <p:nvPr>
+            <p:ph type="sldNum" sz="quarter" idx="10"/>
+          </p:nvPr>
+        </p:nvSpPr>
+        <p:spPr/>
+        <p:txBody>
+          <a:bodyPr/>
+          <a:lstStyle/>
+          <a:p>
+            <a:fld id="{7CB34A70-C7AB-4AAE-AF88-0E84F95289E5}" type="slidenum">
+              <a:rPr lang="de-DE" smtClean="0"/>
+              <a:t>3</a:t>
+            </a:fld>
+            <a:endParaRPr lang="de-DE"/>
+          </a:p>
+        </p:txBody>
+      </p:sp>
+    </p:spTree>
+    <p:extLst>
+      <p:ext uri="{BB962C8B-B14F-4D97-AF65-F5344CB8AC3E}">
+        <p14:creationId xmlns:p14="http://schemas.microsoft.com/office/powerpoint/2010/main" val="1654800329"/>
+      </p:ext>
+    </p:extLst>
+  </p:cSld>
+  <p:clrMapOvr>
+    <a:masterClrMapping/>
+  </p:clrMapOvr>
+</p:notes>
+</file>
+
+<file path=ppt/notesSlides/notesSlide2.xml><?xml version="1.0" encoding="utf-8"?>
+<p:notes xmlns:a="http://schemas.openxmlformats.org/drawingml/2006/main" xmlns:r="http://schemas.openxmlformats.org/officeDocument/2006/relationships" xmlns:p="http://schemas.openxmlformats.org/presentationml/2006/main">
+  <p:cSld>
+    <p:spTree>
+      <p:nvGrpSpPr>
+        <p:cNvPr id="1" name=""/>
+        <p:cNvGrpSpPr/>
+        <p:nvPr/>
+      </p:nvGrpSpPr>
+      <p:grpSpPr>
+        <a:xfrm>
+          <a:off x="0" y="0"/>
+          <a:ext cx="0" cy="0"/>
+          <a:chOff x="0" y="0"/>
+          <a:chExt cx="0" cy="0"/>
+        </a:xfrm>
+      </p:grpSpPr>
+      <p:sp>
+        <p:nvSpPr>
+          <p:cNvPr id="2" name="Slide Image Placeholder 1"/>
+          <p:cNvSpPr>
+            <a:spLocks noGrp="1" noRot="1" noChangeAspect="1"/>
+          </p:cNvSpPr>
+          <p:nvPr>
+            <p:ph type="sldImg"/>
+          </p:nvPr>
+        </p:nvSpPr>
+        <p:spPr/>
+      </p:sp>
+      <p:sp>
+        <p:nvSpPr>
+          <p:cNvPr id="3" name="Notes Placeholder 2"/>
+          <p:cNvSpPr>
+            <a:spLocks noGrp="1"/>
+          </p:cNvSpPr>
+          <p:nvPr>
+            <p:ph type="body" idx="1"/>
+          </p:nvPr>
+        </p:nvSpPr>
+        <p:spPr/>
+        <p:txBody>
+          <a:bodyPr/>
+          <a:lstStyle/>
+          <a:p>
+            <a:r>
+              <a:rPr lang="de-DE" dirty="0"/>
+              <a:t>Objektklasse = Blueprint</a:t>
+            </a:r>
+          </a:p>
+          <a:p>
+            <a:endParaRPr lang="de-DE" dirty="0"/>
+          </a:p>
+        </p:txBody>
+      </p:sp>
+      <p:sp>
+        <p:nvSpPr>
+          <p:cNvPr id="4" name="Slide Number Placeholder 3"/>
+          <p:cNvSpPr>
+            <a:spLocks noGrp="1"/>
+          </p:cNvSpPr>
+          <p:nvPr>
+            <p:ph type="sldNum" sz="quarter" idx="10"/>
+          </p:nvPr>
+        </p:nvSpPr>
+        <p:spPr/>
+        <p:txBody>
+          <a:bodyPr/>
+          <a:lstStyle/>
+          <a:p>
+            <a:fld id="{7CB34A70-C7AB-4AAE-AF88-0E84F95289E5}" type="slidenum">
+              <a:rPr lang="de-DE" smtClean="0"/>
+              <a:t>4</a:t>
+            </a:fld>
+            <a:endParaRPr lang="de-DE"/>
+          </a:p>
+        </p:txBody>
+      </p:sp>
+    </p:spTree>
+    <p:extLst>
+      <p:ext uri="{BB962C8B-B14F-4D97-AF65-F5344CB8AC3E}">
+        <p14:creationId xmlns:p14="http://schemas.microsoft.com/office/powerpoint/2010/main" val="2727137896"/>
+      </p:ext>
+    </p:extLst>
+  </p:cSld>
+  <p:clrMapOvr>
+    <a:masterClrMapping/>
+  </p:clrMapOvr>
+</p:notes>
+</file>
+
 <file path=ppt/slideLayouts/slideLayout1.xml><?xml version="1.0" encoding="utf-8"?>
 <p:sldLayout xmlns:a="http://schemas.openxmlformats.org/drawingml/2006/main" xmlns:r="http://schemas.openxmlformats.org/officeDocument/2006/relationships" xmlns:p="http://schemas.openxmlformats.org/presentationml/2006/main" type="title" preserve="1">
   <p:cSld name="Title Slide">
@@ -252,7 +803,7 @@
           <a:p>
             <a:fld id="{A33CD73A-80A9-4140-8142-C68866F2599D}" type="datetimeFigureOut">
               <a:rPr lang="de-DE" smtClean="0"/>
-              <a:t>04.12.2016</a:t>
+              <a:t>05.12.2016</a:t>
             </a:fld>
             <a:endParaRPr lang="de-DE"/>
           </a:p>
@@ -422,7 +973,7 @@
           <a:p>
             <a:fld id="{A33CD73A-80A9-4140-8142-C68866F2599D}" type="datetimeFigureOut">
               <a:rPr lang="de-DE" smtClean="0"/>
-              <a:t>04.12.2016</a:t>
+              <a:t>05.12.2016</a:t>
             </a:fld>
             <a:endParaRPr lang="de-DE"/>
           </a:p>
@@ -602,7 +1153,7 @@
           <a:p>
             <a:fld id="{A33CD73A-80A9-4140-8142-C68866F2599D}" type="datetimeFigureOut">
               <a:rPr lang="de-DE" smtClean="0"/>
-              <a:t>04.12.2016</a:t>
+              <a:t>05.12.2016</a:t>
             </a:fld>
             <a:endParaRPr lang="de-DE"/>
           </a:p>
@@ -772,7 +1323,7 @@
           <a:p>
             <a:fld id="{A33CD73A-80A9-4140-8142-C68866F2599D}" type="datetimeFigureOut">
               <a:rPr lang="de-DE" smtClean="0"/>
-              <a:t>04.12.2016</a:t>
+              <a:t>05.12.2016</a:t>
             </a:fld>
             <a:endParaRPr lang="de-DE"/>
           </a:p>
@@ -1018,7 +1569,7 @@
           <a:p>
             <a:fld id="{A33CD73A-80A9-4140-8142-C68866F2599D}" type="datetimeFigureOut">
               <a:rPr lang="de-DE" smtClean="0"/>
-              <a:t>04.12.2016</a:t>
+              <a:t>05.12.2016</a:t>
             </a:fld>
             <a:endParaRPr lang="de-DE"/>
           </a:p>
@@ -1250,7 +1801,7 @@
           <a:p>
             <a:fld id="{A33CD73A-80A9-4140-8142-C68866F2599D}" type="datetimeFigureOut">
               <a:rPr lang="de-DE" smtClean="0"/>
-              <a:t>04.12.2016</a:t>
+              <a:t>05.12.2016</a:t>
             </a:fld>
             <a:endParaRPr lang="de-DE"/>
           </a:p>
@@ -1617,7 +2168,7 @@
           <a:p>
             <a:fld id="{A33CD73A-80A9-4140-8142-C68866F2599D}" type="datetimeFigureOut">
               <a:rPr lang="de-DE" smtClean="0"/>
-              <a:t>04.12.2016</a:t>
+              <a:t>05.12.2016</a:t>
             </a:fld>
             <a:endParaRPr lang="de-DE"/>
           </a:p>
@@ -1735,7 +2286,7 @@
           <a:p>
             <a:fld id="{A33CD73A-80A9-4140-8142-C68866F2599D}" type="datetimeFigureOut">
               <a:rPr lang="de-DE" smtClean="0"/>
-              <a:t>04.12.2016</a:t>
+              <a:t>05.12.2016</a:t>
             </a:fld>
             <a:endParaRPr lang="de-DE"/>
           </a:p>
@@ -1830,7 +2381,7 @@
           <a:p>
             <a:fld id="{A33CD73A-80A9-4140-8142-C68866F2599D}" type="datetimeFigureOut">
               <a:rPr lang="de-DE" smtClean="0"/>
-              <a:t>04.12.2016</a:t>
+              <a:t>05.12.2016</a:t>
             </a:fld>
             <a:endParaRPr lang="de-DE"/>
           </a:p>
@@ -2107,7 +2658,7 @@
           <a:p>
             <a:fld id="{A33CD73A-80A9-4140-8142-C68866F2599D}" type="datetimeFigureOut">
               <a:rPr lang="de-DE" smtClean="0"/>
-              <a:t>04.12.2016</a:t>
+              <a:t>05.12.2016</a:t>
             </a:fld>
             <a:endParaRPr lang="de-DE"/>
           </a:p>
@@ -2360,7 +2911,7 @@
           <a:p>
             <a:fld id="{A33CD73A-80A9-4140-8142-C68866F2599D}" type="datetimeFigureOut">
               <a:rPr lang="de-DE" smtClean="0"/>
-              <a:t>04.12.2016</a:t>
+              <a:t>05.12.2016</a:t>
             </a:fld>
             <a:endParaRPr lang="de-DE"/>
           </a:p>
@@ -2573,7 +3124,7 @@
           <a:p>
             <a:fld id="{A33CD73A-80A9-4140-8142-C68866F2599D}" type="datetimeFigureOut">
               <a:rPr lang="de-DE" smtClean="0"/>
-              <a:t>04.12.2016</a:t>
+              <a:t>05.12.2016</a:t>
             </a:fld>
             <a:endParaRPr lang="de-DE"/>
           </a:p>
@@ -3189,9 +3740,8 @@
           <a:p>
             <a:r>
               <a:rPr lang="de-DE" dirty="0"/>
-              <a:t>Beispiel Spieleprogrammierung Enemy and Follower</a:t>
-            </a:r>
-            <a:endParaRPr lang="de-DE" dirty="0"/>
+              <a:t>Beispiel Spieleprogrammierung: Enemy and Follower</a:t>
+            </a:r>
           </a:p>
           <a:p>
             <a:r>
@@ -3366,31 +3916,55 @@
         <p:spPr/>
         <p:txBody>
           <a:bodyPr>
-            <a:normAutofit/>
+            <a:normAutofit lnSpcReduction="10000"/>
           </a:bodyPr>
           <a:lstStyle/>
           <a:p>
             <a:r>
               <a:rPr lang="de-DE" sz="2000" dirty="0"/>
-              <a:t>Methoden können sowohl iterativ als auch rekursiv verwendet werden. Unter einer Iteration (lat. Wiederholung) versteht man die mehrfache Ausführung einer oder mehrerer Anweisungen. Die Iteration realisiert man durch Schleifen (for, while..). Mittels einer Abbruchbedingung wird die Schleife beendet.</a:t>
-            </a:r>
-          </a:p>
-          <a:p>
-            <a:endParaRPr lang="de-DE" sz="2000" dirty="0"/>
+              <a:t>Methoden können sowohl iterativ als auch rekursiv verwendet werden. </a:t>
+            </a:r>
           </a:p>
           <a:p>
             <a:r>
               <a:rPr lang="de-DE" sz="2000" dirty="0"/>
-              <a:t>Von Rekursion (von lateinisch recurrere = zurücklaufen) spricht man, wenn eine Methode sich selbst immer wieder aufruft bis eine Abbruchbedingung erfüllt ist. Jede Rekursion lässt sich auch in eine iterative Lösung umwandeln und umgekehrt.</a:t>
-            </a:r>
-          </a:p>
-          <a:p>
-            <a:endParaRPr lang="de-DE" sz="2000" dirty="0"/>
+              <a:t>Unter einer Iteration (lat. Wiederholung) versteht man die mehrfache Ausführung einer oder mehrerer Anweisungen. </a:t>
+            </a:r>
           </a:p>
           <a:p>
             <a:r>
               <a:rPr lang="de-DE" sz="2000" dirty="0"/>
-              <a:t>Iterationen haben den Vorteil, dass sie performanter sind. Eine Rekursion kommt jedoch meistens mit weniger Quellcode aus und ist übersichtlicher, jedoch dafür speicherintensiver. Rekursionen werden allerdings oft  von Programmieranfängern schwerer verstanden.</a:t>
+              <a:t>Die Iteration realisiert man durch Schleifen (for, while..). Mittels einer Abbruchbedingung wird die Schleife beendet.</a:t>
+            </a:r>
+          </a:p>
+          <a:p>
+            <a:r>
+              <a:rPr lang="de-DE" sz="2000" dirty="0"/>
+              <a:t>Von Rekursion (von lateinisch recurrere = zurücklaufen) spricht man, wenn eine Methode sich selbst immer wieder aufruft bis eine Abbruchbedingung erfüllt ist. </a:t>
+            </a:r>
+          </a:p>
+          <a:p>
+            <a:r>
+              <a:rPr lang="de-DE" sz="2000" dirty="0"/>
+              <a:t>Jede Rekursion lässt sich auch in eine iterative Lösung umwandeln und umgekehrt.</a:t>
+            </a:r>
+          </a:p>
+          <a:p>
+            <a:r>
+              <a:rPr lang="de-DE" sz="2000" dirty="0"/>
+              <a:t>Iterationen haben den Vorteil, dass sie performanter sind. </a:t>
+            </a:r>
+          </a:p>
+          <a:p>
+            <a:r>
+              <a:rPr lang="de-DE" sz="2000" dirty="0"/>
+              <a:t>Eine Rekursion kommt jedoch meistens mit weniger Quellcode aus und ist übersichtlicher, jedoch dafür speicherintensiver. </a:t>
+            </a:r>
+          </a:p>
+          <a:p>
+            <a:r>
+              <a:rPr lang="de-DE" sz="2000" dirty="0"/>
+              <a:t>Rekursionen werden oft  von Programmieranfängern schwerer verstanden.</a:t>
             </a:r>
             <a:br>
               <a:rPr lang="de-DE" sz="2000" dirty="0"/>
@@ -3610,7 +4184,7 @@
         <p:spPr/>
         <p:txBody>
           <a:bodyPr>
-            <a:normAutofit fontScale="92500" lnSpcReduction="10000"/>
+            <a:normAutofit fontScale="92500" lnSpcReduction="20000"/>
           </a:bodyPr>
           <a:lstStyle/>
           <a:p>
@@ -3638,6 +4212,10 @@
               <a:rPr lang="de-DE" dirty="0"/>
               <a:t>Per default bei Variablen </a:t>
             </a:r>
+          </a:p>
+          <a:p>
+            <a:pPr lvl="1"/>
+            <a:endParaRPr lang="de-DE" dirty="0"/>
           </a:p>
           <a:p>
             <a:r>
@@ -3824,7 +4402,7 @@
           <a:p>
             <a:r>
               <a:rPr lang="de-DE" dirty="0"/>
-              <a:t>Instanzmethoden</a:t>
+              <a:t>Instanz Methoden</a:t>
             </a:r>
           </a:p>
         </p:txBody>
@@ -3980,7 +4558,6 @@
               <a:rPr lang="de-DE" dirty="0"/>
               <a:t>Vererbung</a:t>
             </a:r>
-            <a:endParaRPr lang="de-DE" dirty="0"/>
           </a:p>
         </p:txBody>
       </p:sp>
@@ -3997,7 +4574,7 @@
         <p:spPr/>
         <p:txBody>
           <a:bodyPr>
-            <a:normAutofit lnSpcReduction="10000"/>
+            <a:normAutofit fontScale="92500" lnSpcReduction="20000"/>
           </a:bodyPr>
           <a:lstStyle/>
           <a:p>
@@ -4041,8 +4618,15 @@
             <a:pPr lvl="1"/>
             <a:r>
               <a:rPr lang="de-DE" dirty="0"/>
-              <a:t>Static in der definition: Klasseneigene Variable/Methode</a:t>
-            </a:r>
+              <a:t>Static in der definition: Klasseneigene Variable/Methode nicht ohne weiteres sichtbar in Subklasse</a:t>
+            </a:r>
+          </a:p>
+          <a:p>
+            <a:r>
+              <a:rPr lang="de-DE"/>
+              <a:t>Konstruktoren können nicht vererbt werden</a:t>
+            </a:r>
+            <a:endParaRPr lang="de-DE" dirty="0"/>
           </a:p>
         </p:txBody>
       </p:sp>
@@ -4352,4 +4936,299 @@
     </a:ext>
   </a:extLst>
 </a:theme>
+</file>
+
+<file path=ppt/theme/theme2.xml><?xml version="1.0" encoding="utf-8"?>
+<a:theme xmlns:a="http://schemas.openxmlformats.org/drawingml/2006/main" name="Office Theme">
+  <a:themeElements>
+    <a:clrScheme name="Office">
+      <a:dk1>
+        <a:sysClr val="windowText" lastClr="000000"/>
+      </a:dk1>
+      <a:lt1>
+        <a:sysClr val="window" lastClr="FFFFFF"/>
+      </a:lt1>
+      <a:dk2>
+        <a:srgbClr val="44546A"/>
+      </a:dk2>
+      <a:lt2>
+        <a:srgbClr val="E7E6E6"/>
+      </a:lt2>
+      <a:accent1>
+        <a:srgbClr val="5B9BD5"/>
+      </a:accent1>
+      <a:accent2>
+        <a:srgbClr val="ED7D31"/>
+      </a:accent2>
+      <a:accent3>
+        <a:srgbClr val="A5A5A5"/>
+      </a:accent3>
+      <a:accent4>
+        <a:srgbClr val="FFC000"/>
+      </a:accent4>
+      <a:accent5>
+        <a:srgbClr val="4472C4"/>
+      </a:accent5>
+      <a:accent6>
+        <a:srgbClr val="70AD47"/>
+      </a:accent6>
+      <a:hlink>
+        <a:srgbClr val="0563C1"/>
+      </a:hlink>
+      <a:folHlink>
+        <a:srgbClr val="954F72"/>
+      </a:folHlink>
+    </a:clrScheme>
+    <a:fontScheme name="Office">
+      <a:majorFont>
+        <a:latin typeface="Calibri Light" panose="020F0302020204030204"/>
+        <a:ea typeface=""/>
+        <a:cs typeface=""/>
+        <a:font script="Jpan" typeface="游ゴシック Light"/>
+        <a:font script="Hang" typeface="맑은 고딕"/>
+        <a:font script="Hans" typeface="等线 Light"/>
+        <a:font script="Hant" typeface="新細明體"/>
+        <a:font script="Arab" typeface="Times New Roman"/>
+        <a:font script="Hebr" typeface="Times New Roman"/>
+        <a:font script="Thai" typeface="Angsana New"/>
+        <a:font script="Ethi" typeface="Nyala"/>
+        <a:font script="Beng" typeface="Vrinda"/>
+        <a:font script="Gujr" typeface="Shruti"/>
+        <a:font script="Khmr" typeface="MoolBoran"/>
+        <a:font script="Knda" typeface="Tunga"/>
+        <a:font script="Guru" typeface="Raavi"/>
+        <a:font script="Cans" typeface="Euphemia"/>
+        <a:font script="Cher" typeface="Plantagenet Cherokee"/>
+        <a:font script="Yiii" typeface="Microsoft Yi Baiti"/>
+        <a:font script="Tibt" typeface="Microsoft Himalaya"/>
+        <a:font script="Thaa" typeface="MV Boli"/>
+        <a:font script="Deva" typeface="Mangal"/>
+        <a:font script="Telu" typeface="Gautami"/>
+        <a:font script="Taml" typeface="Latha"/>
+        <a:font script="Syrc" typeface="Estrangelo Edessa"/>
+        <a:font script="Orya" typeface="Kalinga"/>
+        <a:font script="Mlym" typeface="Kartika"/>
+        <a:font script="Laoo" typeface="DokChampa"/>
+        <a:font script="Sinh" typeface="Iskoola Pota"/>
+        <a:font script="Mong" typeface="Mongolian Baiti"/>
+        <a:font script="Viet" typeface="Times New Roman"/>
+        <a:font script="Uigh" typeface="Microsoft Uighur"/>
+        <a:font script="Geor" typeface="Sylfaen"/>
+        <a:font script="Armn" typeface="Arial"/>
+        <a:font script="Bugi" typeface="Leelawadee UI"/>
+        <a:font script="Bopo" typeface="Microsoft JhengHei"/>
+        <a:font script="Java" typeface="Javanese Text"/>
+        <a:font script="Lisu" typeface="Segoe UI"/>
+        <a:font script="Mymr" typeface="Myanmar Text"/>
+        <a:font script="Nkoo" typeface="Ebrima"/>
+        <a:font script="Olck" typeface="Nirmala UI"/>
+        <a:font script="Osma" typeface="Ebrima"/>
+        <a:font script="Phag" typeface="Phagspa"/>
+        <a:font script="Syrn" typeface="Estrangelo Edessa"/>
+        <a:font script="Syrj" typeface="Estrangelo Edessa"/>
+        <a:font script="Syre" typeface="Estrangelo Edessa"/>
+        <a:font script="Sora" typeface="Nirmala UI"/>
+        <a:font script="Tale" typeface="Microsoft Tai Le"/>
+        <a:font script="Talu" typeface="Microsoft New Tai Lue"/>
+        <a:font script="Tfng" typeface="Ebrima"/>
+      </a:majorFont>
+      <a:minorFont>
+        <a:latin typeface="Calibri" panose="020F0502020204030204"/>
+        <a:ea typeface=""/>
+        <a:cs typeface=""/>
+        <a:font script="Jpan" typeface="游ゴシック"/>
+        <a:font script="Hang" typeface="맑은 고딕"/>
+        <a:font script="Hans" typeface="等线"/>
+        <a:font script="Hant" typeface="新細明體"/>
+        <a:font script="Arab" typeface="Arial"/>
+        <a:font script="Hebr" typeface="Arial"/>
+        <a:font script="Thai" typeface="Cordia New"/>
+        <a:font script="Ethi" typeface="Nyala"/>
+        <a:font script="Beng" typeface="Vrinda"/>
+        <a:font script="Gujr" typeface="Shruti"/>
+        <a:font script="Khmr" typeface="DaunPenh"/>
+        <a:font script="Knda" typeface="Tunga"/>
+        <a:font script="Guru" typeface="Raavi"/>
+        <a:font script="Cans" typeface="Euphemia"/>
+        <a:font script="Cher" typeface="Plantagenet Cherokee"/>
+        <a:font script="Yiii" typeface="Microsoft Yi Baiti"/>
+        <a:font script="Tibt" typeface="Microsoft Himalaya"/>
+        <a:font script="Thaa" typeface="MV Boli"/>
+        <a:font script="Deva" typeface="Mangal"/>
+        <a:font script="Telu" typeface="Gautami"/>
+        <a:font script="Taml" typeface="Latha"/>
+        <a:font script="Syrc" typeface="Estrangelo Edessa"/>
+        <a:font script="Orya" typeface="Kalinga"/>
+        <a:font script="Mlym" typeface="Kartika"/>
+        <a:font script="Laoo" typeface="DokChampa"/>
+        <a:font script="Sinh" typeface="Iskoola Pota"/>
+        <a:font script="Mong" typeface="Mongolian Baiti"/>
+        <a:font script="Viet" typeface="Arial"/>
+        <a:font script="Uigh" typeface="Microsoft Uighur"/>
+        <a:font script="Geor" typeface="Sylfaen"/>
+        <a:font script="Armn" typeface="Arial"/>
+        <a:font script="Bugi" typeface="Leelawadee UI"/>
+        <a:font script="Bopo" typeface="Microsoft JhengHei"/>
+        <a:font script="Java" typeface="Javanese Text"/>
+        <a:font script="Lisu" typeface="Segoe UI"/>
+        <a:font script="Mymr" typeface="Myanmar Text"/>
+        <a:font script="Nkoo" typeface="Ebrima"/>
+        <a:font script="Olck" typeface="Nirmala UI"/>
+        <a:font script="Osma" typeface="Ebrima"/>
+        <a:font script="Phag" typeface="Phagspa"/>
+        <a:font script="Syrn" typeface="Estrangelo Edessa"/>
+        <a:font script="Syrj" typeface="Estrangelo Edessa"/>
+        <a:font script="Syre" typeface="Estrangelo Edessa"/>
+        <a:font script="Sora" typeface="Nirmala UI"/>
+        <a:font script="Tale" typeface="Microsoft Tai Le"/>
+        <a:font script="Talu" typeface="Microsoft New Tai Lue"/>
+        <a:font script="Tfng" typeface="Ebrima"/>
+      </a:minorFont>
+    </a:fontScheme>
+    <a:fmtScheme name="Office">
+      <a:fillStyleLst>
+        <a:solidFill>
+          <a:schemeClr val="phClr"/>
+        </a:solidFill>
+        <a:gradFill rotWithShape="1">
+          <a:gsLst>
+            <a:gs pos="0">
+              <a:schemeClr val="phClr">
+                <a:lumMod val="110000"/>
+                <a:satMod val="105000"/>
+                <a:tint val="67000"/>
+              </a:schemeClr>
+            </a:gs>
+            <a:gs pos="50000">
+              <a:schemeClr val="phClr">
+                <a:lumMod val="105000"/>
+                <a:satMod val="103000"/>
+                <a:tint val="73000"/>
+              </a:schemeClr>
+            </a:gs>
+            <a:gs pos="100000">
+              <a:schemeClr val="phClr">
+                <a:lumMod val="105000"/>
+                <a:satMod val="109000"/>
+                <a:tint val="81000"/>
+              </a:schemeClr>
+            </a:gs>
+          </a:gsLst>
+          <a:lin ang="5400000" scaled="0"/>
+        </a:gradFill>
+        <a:gradFill rotWithShape="1">
+          <a:gsLst>
+            <a:gs pos="0">
+              <a:schemeClr val="phClr">
+                <a:satMod val="103000"/>
+                <a:lumMod val="102000"/>
+                <a:tint val="94000"/>
+              </a:schemeClr>
+            </a:gs>
+            <a:gs pos="50000">
+              <a:schemeClr val="phClr">
+                <a:satMod val="110000"/>
+                <a:lumMod val="100000"/>
+                <a:shade val="100000"/>
+              </a:schemeClr>
+            </a:gs>
+            <a:gs pos="100000">
+              <a:schemeClr val="phClr">
+                <a:lumMod val="99000"/>
+                <a:satMod val="120000"/>
+                <a:shade val="78000"/>
+              </a:schemeClr>
+            </a:gs>
+          </a:gsLst>
+          <a:lin ang="5400000" scaled="0"/>
+        </a:gradFill>
+      </a:fillStyleLst>
+      <a:lnStyleLst>
+        <a:ln w="6350" cap="flat" cmpd="sng" algn="ctr">
+          <a:solidFill>
+            <a:schemeClr val="phClr"/>
+          </a:solidFill>
+          <a:prstDash val="solid"/>
+          <a:miter lim="800000"/>
+        </a:ln>
+        <a:ln w="12700" cap="flat" cmpd="sng" algn="ctr">
+          <a:solidFill>
+            <a:schemeClr val="phClr"/>
+          </a:solidFill>
+          <a:prstDash val="solid"/>
+          <a:miter lim="800000"/>
+        </a:ln>
+        <a:ln w="19050" cap="flat" cmpd="sng" algn="ctr">
+          <a:solidFill>
+            <a:schemeClr val="phClr"/>
+          </a:solidFill>
+          <a:prstDash val="solid"/>
+          <a:miter lim="800000"/>
+        </a:ln>
+      </a:lnStyleLst>
+      <a:effectStyleLst>
+        <a:effectStyle>
+          <a:effectLst/>
+        </a:effectStyle>
+        <a:effectStyle>
+          <a:effectLst/>
+        </a:effectStyle>
+        <a:effectStyle>
+          <a:effectLst>
+            <a:outerShdw blurRad="57150" dist="19050" dir="5400000" algn="ctr" rotWithShape="0">
+              <a:srgbClr val="000000">
+                <a:alpha val="63000"/>
+              </a:srgbClr>
+            </a:outerShdw>
+          </a:effectLst>
+        </a:effectStyle>
+      </a:effectStyleLst>
+      <a:bgFillStyleLst>
+        <a:solidFill>
+          <a:schemeClr val="phClr"/>
+        </a:solidFill>
+        <a:solidFill>
+          <a:schemeClr val="phClr">
+            <a:tint val="95000"/>
+            <a:satMod val="170000"/>
+          </a:schemeClr>
+        </a:solidFill>
+        <a:gradFill rotWithShape="1">
+          <a:gsLst>
+            <a:gs pos="0">
+              <a:schemeClr val="phClr">
+                <a:tint val="93000"/>
+                <a:satMod val="150000"/>
+                <a:shade val="98000"/>
+                <a:lumMod val="102000"/>
+              </a:schemeClr>
+            </a:gs>
+            <a:gs pos="50000">
+              <a:schemeClr val="phClr">
+                <a:tint val="98000"/>
+                <a:satMod val="130000"/>
+                <a:shade val="90000"/>
+                <a:lumMod val="103000"/>
+              </a:schemeClr>
+            </a:gs>
+            <a:gs pos="100000">
+              <a:schemeClr val="phClr">
+                <a:shade val="63000"/>
+                <a:satMod val="120000"/>
+              </a:schemeClr>
+            </a:gs>
+          </a:gsLst>
+          <a:lin ang="5400000" scaled="0"/>
+        </a:gradFill>
+      </a:bgFillStyleLst>
+    </a:fmtScheme>
+  </a:themeElements>
+  <a:objectDefaults/>
+  <a:extraClrSchemeLst/>
+  <a:extLst>
+    <a:ext uri="{05A4C25C-085E-4340-85A3-A5531E510DB2}">
+      <thm15:themeFamily xmlns:thm15="http://schemas.microsoft.com/office/thememl/2012/main" name="Office Theme" id="{62F939B6-93AF-4DB8-9C6B-D6C7DFDC589F}" vid="{4A3C46E8-61CC-4603-A589-7422A47A8E4A}"/>
+    </a:ext>
+  </a:extLst>
+</a:theme>
 </file>
</xml_diff>